<commit_message>
Update figures for Mantel Test
</commit_message>
<xml_diff>
--- a/Figures_data/Plots/Appendix_Cassiope_figures_May2023.pptx
+++ b/Figures_data/Plots/Appendix_Cassiope_figures_May2023.pptx
@@ -251,7 +251,7 @@
       <p15:sldGuideLst xmlns:p15="http://schemas.microsoft.com/office/powerpoint/2012/main"/>
     </p:ext>
     <p:ext uri="GoogleSlidesCustomDataVersion2">
-      <go:slidesCustomData xmlns="" xmlns:mc="http://schemas.openxmlformats.org/markup-compatibility/2006" xmlns:mv="urn:schemas-microsoft-com:mac:vml" xmlns:c="http://schemas.openxmlformats.org/drawingml/2006/chart" xmlns:dgm="http://schemas.openxmlformats.org/drawingml/2006/diagram" xmlns:o="urn:schemas-microsoft-com:office:office" xmlns:v="urn:schemas-microsoft-com:vml" xmlns:pvml="urn:schemas-microsoft-com:office:powerpoint" xmlns:com="http://schemas.openxmlformats.org/drawingml/2006/compatibility" xmlns:p14="http://schemas.microsoft.com/office/powerpoint/2010/main" xmlns:p15="http://schemas.microsoft.com/office/powerpoint/2012/main" xmlns:ahyp="http://schemas.microsoft.com/office/drawing/2018/hyperlinkcolor" xmlns:go="http://customooxmlschemas.google.com/" r:id="rId11" roundtripDataSignature="AMtx7mjvLvk7WJDMKttQ/RpjAFORGtSsaw=="/>
+      <go:slidesCustomData xmlns:go="http://customooxmlschemas.google.com/" xmlns:ahyp="http://schemas.microsoft.com/office/drawing/2018/hyperlinkcolor" xmlns:p15="http://schemas.microsoft.com/office/powerpoint/2012/main" xmlns:p14="http://schemas.microsoft.com/office/powerpoint/2010/main" xmlns:com="http://schemas.openxmlformats.org/drawingml/2006/compatibility" xmlns:pvml="urn:schemas-microsoft-com:office:powerpoint" xmlns:v="urn:schemas-microsoft-com:vml" xmlns:o="urn:schemas-microsoft-com:office:office" xmlns:dgm="http://schemas.openxmlformats.org/drawingml/2006/diagram" xmlns:c="http://schemas.openxmlformats.org/drawingml/2006/chart" xmlns:mv="urn:schemas-microsoft-com:mac:vml" xmlns:mc="http://schemas.openxmlformats.org/markup-compatibility/2006" xmlns="" r:id="rId11" roundtripDataSignature="AMtx7mjvLvk7WJDMKttQ/RpjAFORGtSsaw=="/>
     </p:ext>
   </p:extLst>
 </p:presentation>
@@ -19437,49 +19437,12 @@
           <a:chExt cx="0" cy="0"/>
         </a:xfrm>
       </p:grpSpPr>
-      <p:sp>
-        <p:nvSpPr>
-          <p:cNvPr id="11" name="TextBox 10">
+      <p:grpSp>
+        <p:nvGrpSpPr>
+          <p:cNvPr id="35" name="Group 34">
             <a:extLst>
               <a:ext uri="{FF2B5EF4-FFF2-40B4-BE49-F238E27FC236}">
-                <a16:creationId xmlns:a16="http://schemas.microsoft.com/office/drawing/2014/main" id="{1C00055E-5741-FF82-EE65-3992F1FB10FD}"/>
-              </a:ext>
-            </a:extLst>
-          </p:cNvPr>
-          <p:cNvSpPr txBox="1"/>
-          <p:nvPr/>
-        </p:nvSpPr>
-        <p:spPr>
-          <a:xfrm rot="16200000">
-            <a:off x="4133346" y="6942615"/>
-            <a:ext cx="735063" cy="319647"/>
-          </a:xfrm>
-          <a:prstGeom prst="rect">
-            <a:avLst/>
-          </a:prstGeom>
-          <a:solidFill>
-            <a:schemeClr val="bg1"/>
-          </a:solidFill>
-        </p:spPr>
-        <p:txBody>
-          <a:bodyPr wrap="square" rtlCol="0">
-            <a:spAutoFit/>
-          </a:bodyPr>
-          <a:lstStyle/>
-          <a:p>
-            <a:r>
-              <a:rPr lang="en-CA" dirty="0"/>
-              <a:t>Russia</a:t>
-            </a:r>
-          </a:p>
-        </p:txBody>
-      </p:sp>
-      <p:grpSp>
-        <p:nvGrpSpPr>
-          <p:cNvPr id="27" name="Group 26">
-            <a:extLst>
-              <a:ext uri="{FF2B5EF4-FFF2-40B4-BE49-F238E27FC236}">
-                <a16:creationId xmlns:a16="http://schemas.microsoft.com/office/drawing/2014/main" id="{61C1424D-3BE0-1771-733E-7C5B8122A397}"/>
+                <a16:creationId xmlns:a16="http://schemas.microsoft.com/office/drawing/2014/main" id="{D8D4805B-E2E6-309D-05E3-92C18B2AAEA0}"/>
               </a:ext>
             </a:extLst>
           </p:cNvPr>
@@ -19489,45 +19452,77 @@
         <p:grpSpPr>
           <a:xfrm>
             <a:off x="-245194" y="68232"/>
-            <a:ext cx="9248517" cy="14068411"/>
+            <a:ext cx="13916489" cy="12580414"/>
             <a:chOff x="-245194" y="68232"/>
-            <a:chExt cx="9248517" cy="14068411"/>
+            <a:chExt cx="13916489" cy="12580414"/>
           </a:xfrm>
         </p:grpSpPr>
         <p:pic>
           <p:nvPicPr>
-            <p:cNvPr id="167" name="Google Shape;167;p18"/>
-            <p:cNvPicPr preferRelativeResize="0"/>
+            <p:cNvPr id="32" name="Picture 31" descr="A graph of a number of dots&#10;&#10;Description automatically generated with medium confidence">
+              <a:extLst>
+                <a:ext uri="{FF2B5EF4-FFF2-40B4-BE49-F238E27FC236}">
+                  <a16:creationId xmlns:a16="http://schemas.microsoft.com/office/drawing/2014/main" id="{E04A27B4-F24A-669F-65C8-C6EE90CA1815}"/>
+                </a:ext>
+              </a:extLst>
+            </p:cNvPr>
+            <p:cNvPicPr>
+              <a:picLocks noChangeAspect="1"/>
+            </p:cNvPicPr>
             <p:nvPr/>
           </p:nvPicPr>
           <p:blipFill>
-            <a:blip r:embed="rId3">
-              <a:alphaModFix/>
-            </a:blip>
+            <a:blip r:embed="rId3"/>
             <a:stretch>
               <a:fillRect/>
             </a:stretch>
           </p:blipFill>
           <p:spPr>
             <a:xfrm>
-              <a:off x="179375" y="7847048"/>
-              <a:ext cx="8823948" cy="6289595"/>
+              <a:off x="6813295" y="7751382"/>
+              <a:ext cx="6858000" cy="4848606"/>
             </a:xfrm>
             <a:prstGeom prst="rect">
               <a:avLst/>
             </a:prstGeom>
-            <a:noFill/>
-            <a:ln>
-              <a:noFill/>
-            </a:ln>
+          </p:spPr>
+        </p:pic>
+        <p:pic>
+          <p:nvPicPr>
+            <p:cNvPr id="34" name="Picture 33" descr="A diagram of a map&#10;&#10;Description automatically generated with medium confidence">
+              <a:extLst>
+                <a:ext uri="{FF2B5EF4-FFF2-40B4-BE49-F238E27FC236}">
+                  <a16:creationId xmlns:a16="http://schemas.microsoft.com/office/drawing/2014/main" id="{5617E03F-D728-172B-858F-A01D981BA453}"/>
+                </a:ext>
+              </a:extLst>
+            </p:cNvPr>
+            <p:cNvPicPr>
+              <a:picLocks noChangeAspect="1"/>
+            </p:cNvPicPr>
+            <p:nvPr/>
+          </p:nvPicPr>
+          <p:blipFill>
+            <a:blip r:embed="rId4"/>
+            <a:stretch>
+              <a:fillRect/>
+            </a:stretch>
+          </p:blipFill>
+          <p:spPr>
+            <a:xfrm>
+              <a:off x="-44705" y="7800040"/>
+              <a:ext cx="6858000" cy="4848606"/>
+            </a:xfrm>
+            <a:prstGeom prst="rect">
+              <a:avLst/>
+            </a:prstGeom>
           </p:spPr>
         </p:pic>
         <p:grpSp>
           <p:nvGrpSpPr>
-            <p:cNvPr id="13" name="Group 12">
+            <p:cNvPr id="22" name="Group 21">
               <a:extLst>
                 <a:ext uri="{FF2B5EF4-FFF2-40B4-BE49-F238E27FC236}">
-                  <a16:creationId xmlns:a16="http://schemas.microsoft.com/office/drawing/2014/main" id="{F6C4C29E-FDA8-7B74-3D56-6E721BEE8C4D}"/>
+                  <a16:creationId xmlns:a16="http://schemas.microsoft.com/office/drawing/2014/main" id="{849D5C72-5E36-454A-1A1A-196C0B5A3759}"/>
                 </a:ext>
               </a:extLst>
             </p:cNvPr>
@@ -19537,17 +19532,17 @@
           <p:grpSpPr>
             <a:xfrm>
               <a:off x="-245194" y="68232"/>
-              <a:ext cx="7103194" cy="7811599"/>
-              <a:chOff x="-437720" y="168325"/>
-              <a:chExt cx="7103194" cy="7811599"/>
+              <a:ext cx="9113068" cy="8101099"/>
+              <a:chOff x="-245194" y="68232"/>
+              <a:chExt cx="9113068" cy="8101099"/>
             </a:xfrm>
           </p:grpSpPr>
           <p:grpSp>
             <p:nvGrpSpPr>
-              <p:cNvPr id="8" name="Group 7">
+              <p:cNvPr id="27" name="Group 26">
                 <a:extLst>
                   <a:ext uri="{FF2B5EF4-FFF2-40B4-BE49-F238E27FC236}">
-                    <a16:creationId xmlns:a16="http://schemas.microsoft.com/office/drawing/2014/main" id="{4C700047-3F0F-7AB8-F21E-114BF77DD318}"/>
+                    <a16:creationId xmlns:a16="http://schemas.microsoft.com/office/drawing/2014/main" id="{61C1424D-3BE0-1771-733E-7C5B8122A397}"/>
                   </a:ext>
                 </a:extLst>
               </p:cNvPr>
@@ -19556,29 +19551,358 @@
             </p:nvGrpSpPr>
             <p:grpSpPr>
               <a:xfrm>
-                <a:off x="-437720" y="168325"/>
-                <a:ext cx="7103194" cy="7252424"/>
-                <a:chOff x="-437720" y="168325"/>
-                <a:chExt cx="7103194" cy="7252424"/>
+                <a:off x="-245194" y="68232"/>
+                <a:ext cx="7103194" cy="8101099"/>
+                <a:chOff x="-245194" y="68232"/>
+                <a:chExt cx="7103194" cy="8101099"/>
               </a:xfrm>
             </p:grpSpPr>
-            <p:pic>
-              <p:nvPicPr>
-                <p:cNvPr id="165" name="Google Shape;165;p18"/>
-                <p:cNvPicPr preferRelativeResize="0"/>
+            <p:grpSp>
+              <p:nvGrpSpPr>
+                <p:cNvPr id="13" name="Group 12">
+                  <a:extLst>
+                    <a:ext uri="{FF2B5EF4-FFF2-40B4-BE49-F238E27FC236}">
+                      <a16:creationId xmlns:a16="http://schemas.microsoft.com/office/drawing/2014/main" id="{F6C4C29E-FDA8-7B74-3D56-6E721BEE8C4D}"/>
+                    </a:ext>
+                  </a:extLst>
+                </p:cNvPr>
+                <p:cNvGrpSpPr/>
                 <p:nvPr/>
-              </p:nvPicPr>
-              <p:blipFill rotWithShape="1">
-                <a:blip r:embed="rId4">
-                  <a:alphaModFix/>
-                </a:blip>
-                <a:srcRect r="12800"/>
-                <a:stretch/>
-              </p:blipFill>
+              </p:nvGrpSpPr>
+              <p:grpSpPr>
+                <a:xfrm>
+                  <a:off x="-245194" y="68232"/>
+                  <a:ext cx="7103194" cy="7811599"/>
+                  <a:chOff x="-437720" y="168325"/>
+                  <a:chExt cx="7103194" cy="7811599"/>
+                </a:xfrm>
+              </p:grpSpPr>
+              <p:grpSp>
+                <p:nvGrpSpPr>
+                  <p:cNvPr id="8" name="Group 7">
+                    <a:extLst>
+                      <a:ext uri="{FF2B5EF4-FFF2-40B4-BE49-F238E27FC236}">
+                        <a16:creationId xmlns:a16="http://schemas.microsoft.com/office/drawing/2014/main" id="{4C700047-3F0F-7AB8-F21E-114BF77DD318}"/>
+                      </a:ext>
+                    </a:extLst>
+                  </p:cNvPr>
+                  <p:cNvGrpSpPr/>
+                  <p:nvPr/>
+                </p:nvGrpSpPr>
+                <p:grpSpPr>
+                  <a:xfrm>
+                    <a:off x="-437720" y="168325"/>
+                    <a:ext cx="7103194" cy="7252424"/>
+                    <a:chOff x="-437720" y="168325"/>
+                    <a:chExt cx="7103194" cy="7252424"/>
+                  </a:xfrm>
+                </p:grpSpPr>
+                <p:pic>
+                  <p:nvPicPr>
+                    <p:cNvPr id="165" name="Google Shape;165;p18"/>
+                    <p:cNvPicPr preferRelativeResize="0"/>
+                    <p:nvPr/>
+                  </p:nvPicPr>
+                  <p:blipFill rotWithShape="1">
+                    <a:blip r:embed="rId5">
+                      <a:alphaModFix/>
+                    </a:blip>
+                    <a:srcRect r="12800"/>
+                    <a:stretch/>
+                  </p:blipFill>
+                  <p:spPr>
+                    <a:xfrm>
+                      <a:off x="341450" y="168325"/>
+                      <a:ext cx="6324024" cy="7252424"/>
+                    </a:xfrm>
+                    <a:prstGeom prst="rect">
+                      <a:avLst/>
+                    </a:prstGeom>
+                    <a:noFill/>
+                    <a:ln>
+                      <a:noFill/>
+                    </a:ln>
+                  </p:spPr>
+                </p:pic>
+                <p:sp>
+                  <p:nvSpPr>
+                    <p:cNvPr id="3" name="TextBox 2">
+                      <a:extLst>
+                        <a:ext uri="{FF2B5EF4-FFF2-40B4-BE49-F238E27FC236}">
+                          <a16:creationId xmlns:a16="http://schemas.microsoft.com/office/drawing/2014/main" id="{79585466-EF82-F3E0-6011-D5E29820E2B7}"/>
+                        </a:ext>
+                      </a:extLst>
+                    </p:cNvPr>
+                    <p:cNvSpPr txBox="1"/>
+                    <p:nvPr/>
+                  </p:nvSpPr>
+                  <p:spPr>
+                    <a:xfrm>
+                      <a:off x="31640" y="873653"/>
+                      <a:ext cx="770194" cy="307777"/>
+                    </a:xfrm>
+                    <a:prstGeom prst="rect">
+                      <a:avLst/>
+                    </a:prstGeom>
+                    <a:solidFill>
+                      <a:schemeClr val="bg1"/>
+                    </a:solidFill>
+                  </p:spPr>
+                  <p:txBody>
+                    <a:bodyPr wrap="square" rtlCol="0">
+                      <a:spAutoFit/>
+                    </a:bodyPr>
+                    <a:lstStyle/>
+                    <a:p>
+                      <a:r>
+                        <a:rPr lang="en-CA" dirty="0"/>
+                        <a:t>Alaska</a:t>
+                      </a:r>
+                    </a:p>
+                  </p:txBody>
+                </p:sp>
+                <p:sp>
+                  <p:nvSpPr>
+                    <p:cNvPr id="4" name="TextBox 3">
+                      <a:extLst>
+                        <a:ext uri="{FF2B5EF4-FFF2-40B4-BE49-F238E27FC236}">
+                          <a16:creationId xmlns:a16="http://schemas.microsoft.com/office/drawing/2014/main" id="{BB270E99-CBCB-CDFC-F86B-F7F0AEF9080B}"/>
+                        </a:ext>
+                      </a:extLst>
+                    </p:cNvPr>
+                    <p:cNvSpPr txBox="1"/>
+                    <p:nvPr/>
+                  </p:nvSpPr>
+                  <p:spPr>
+                    <a:xfrm>
+                      <a:off x="58178" y="2099595"/>
+                      <a:ext cx="770194" cy="307777"/>
+                    </a:xfrm>
+                    <a:prstGeom prst="rect">
+                      <a:avLst/>
+                    </a:prstGeom>
+                    <a:solidFill>
+                      <a:schemeClr val="bg1"/>
+                    </a:solidFill>
+                  </p:spPr>
+                  <p:txBody>
+                    <a:bodyPr wrap="square" rtlCol="0">
+                      <a:spAutoFit/>
+                    </a:bodyPr>
+                    <a:lstStyle/>
+                    <a:p>
+                      <a:r>
+                        <a:rPr lang="en-CA" dirty="0"/>
+                        <a:t>Europe</a:t>
+                      </a:r>
+                    </a:p>
+                  </p:txBody>
+                </p:sp>
+                <p:sp>
+                  <p:nvSpPr>
+                    <p:cNvPr id="5" name="TextBox 4">
+                      <a:extLst>
+                        <a:ext uri="{FF2B5EF4-FFF2-40B4-BE49-F238E27FC236}">
+                          <a16:creationId xmlns:a16="http://schemas.microsoft.com/office/drawing/2014/main" id="{F25BEFB4-22DA-48C4-B23C-DA2057D7D90C}"/>
+                        </a:ext>
+                      </a:extLst>
+                    </p:cNvPr>
+                    <p:cNvSpPr txBox="1"/>
+                    <p:nvPr/>
+                  </p:nvSpPr>
+                  <p:spPr>
+                    <a:xfrm>
+                      <a:off x="-237231" y="3367935"/>
+                      <a:ext cx="1083188" cy="307777"/>
+                    </a:xfrm>
+                    <a:prstGeom prst="rect">
+                      <a:avLst/>
+                    </a:prstGeom>
+                    <a:solidFill>
+                      <a:schemeClr val="bg1"/>
+                    </a:solidFill>
+                  </p:spPr>
+                  <p:txBody>
+                    <a:bodyPr wrap="square" rtlCol="0">
+                      <a:spAutoFit/>
+                    </a:bodyPr>
+                    <a:lstStyle/>
+                    <a:p>
+                      <a:r>
+                        <a:rPr lang="en-CA" dirty="0"/>
+                        <a:t>Greenland</a:t>
+                      </a:r>
+                    </a:p>
+                  </p:txBody>
+                </p:sp>
+                <p:sp>
+                  <p:nvSpPr>
+                    <p:cNvPr id="6" name="TextBox 5">
+                      <a:extLst>
+                        <a:ext uri="{FF2B5EF4-FFF2-40B4-BE49-F238E27FC236}">
+                          <a16:creationId xmlns:a16="http://schemas.microsoft.com/office/drawing/2014/main" id="{071D517C-5437-B26F-ED08-1DCA3A993FEA}"/>
+                        </a:ext>
+                      </a:extLst>
+                    </p:cNvPr>
+                    <p:cNvSpPr txBox="1"/>
+                    <p:nvPr/>
+                  </p:nvSpPr>
+                  <p:spPr>
+                    <a:xfrm>
+                      <a:off x="17584" y="4636275"/>
+                      <a:ext cx="819418" cy="307777"/>
+                    </a:xfrm>
+                    <a:prstGeom prst="rect">
+                      <a:avLst/>
+                    </a:prstGeom>
+                    <a:solidFill>
+                      <a:schemeClr val="bg1"/>
+                    </a:solidFill>
+                  </p:spPr>
+                  <p:txBody>
+                    <a:bodyPr wrap="square" rtlCol="0">
+                      <a:spAutoFit/>
+                    </a:bodyPr>
+                    <a:lstStyle/>
+                    <a:p>
+                      <a:r>
+                        <a:rPr lang="en-CA" dirty="0"/>
+                        <a:t>Russia</a:t>
+                      </a:r>
+                    </a:p>
+                  </p:txBody>
+                </p:sp>
+                <p:sp>
+                  <p:nvSpPr>
+                    <p:cNvPr id="7" name="TextBox 6">
+                      <a:extLst>
+                        <a:ext uri="{FF2B5EF4-FFF2-40B4-BE49-F238E27FC236}">
+                          <a16:creationId xmlns:a16="http://schemas.microsoft.com/office/drawing/2014/main" id="{71419262-E29D-A5E5-1B86-E60414B9F7CF}"/>
+                        </a:ext>
+                      </a:extLst>
+                    </p:cNvPr>
+                    <p:cNvSpPr txBox="1"/>
+                    <p:nvPr/>
+                  </p:nvSpPr>
+                  <p:spPr>
+                    <a:xfrm>
+                      <a:off x="-437720" y="5874623"/>
+                      <a:ext cx="1294203" cy="307777"/>
+                    </a:xfrm>
+                    <a:prstGeom prst="rect">
+                      <a:avLst/>
+                    </a:prstGeom>
+                    <a:solidFill>
+                      <a:schemeClr val="bg1"/>
+                    </a:solidFill>
+                  </p:spPr>
+                  <p:txBody>
+                    <a:bodyPr wrap="square" rtlCol="0">
+                      <a:spAutoFit/>
+                    </a:bodyPr>
+                    <a:lstStyle/>
+                    <a:p>
+                      <a:r>
+                        <a:rPr lang="en-CA" dirty="0" err="1"/>
+                        <a:t>Saximontana</a:t>
+                      </a:r>
+                      <a:endParaRPr lang="en-CA" dirty="0"/>
+                    </a:p>
+                  </p:txBody>
+                </p:sp>
+              </p:grpSp>
+              <p:sp>
+                <p:nvSpPr>
+                  <p:cNvPr id="9" name="TextBox 8">
+                    <a:extLst>
+                      <a:ext uri="{FF2B5EF4-FFF2-40B4-BE49-F238E27FC236}">
+                        <a16:creationId xmlns:a16="http://schemas.microsoft.com/office/drawing/2014/main" id="{F6E174F9-7AD0-B4E2-2DEF-61BBDA459112}"/>
+                      </a:ext>
+                    </a:extLst>
+                  </p:cNvPr>
+                  <p:cNvSpPr txBox="1"/>
+                  <p:nvPr/>
+                </p:nvSpPr>
+                <p:spPr>
+                  <a:xfrm rot="16200000">
+                    <a:off x="4950253" y="7096824"/>
+                    <a:ext cx="1245019" cy="521182"/>
+                  </a:xfrm>
+                  <a:prstGeom prst="rect">
+                    <a:avLst/>
+                  </a:prstGeom>
+                  <a:solidFill>
+                    <a:schemeClr val="bg1"/>
+                  </a:solidFill>
+                </p:spPr>
+                <p:txBody>
+                  <a:bodyPr wrap="square" rtlCol="0">
+                    <a:spAutoFit/>
+                  </a:bodyPr>
+                  <a:lstStyle/>
+                  <a:p>
+                    <a:r>
+                      <a:rPr lang="en-CA" dirty="0" err="1"/>
+                      <a:t>Saximontana</a:t>
+                    </a:r>
+                    <a:endParaRPr lang="en-CA" dirty="0"/>
+                  </a:p>
+                </p:txBody>
+              </p:sp>
+              <p:sp>
+                <p:nvSpPr>
+                  <p:cNvPr id="10" name="TextBox 9">
+                    <a:extLst>
+                      <a:ext uri="{FF2B5EF4-FFF2-40B4-BE49-F238E27FC236}">
+                        <a16:creationId xmlns:a16="http://schemas.microsoft.com/office/drawing/2014/main" id="{94D67BA5-D9DF-DD44-E039-C16C3B536B12}"/>
+                      </a:ext>
+                    </a:extLst>
+                  </p:cNvPr>
+                  <p:cNvSpPr txBox="1"/>
+                  <p:nvPr/>
+                </p:nvSpPr>
+                <p:spPr>
+                  <a:xfrm rot="16200000">
+                    <a:off x="2872920" y="7131153"/>
+                    <a:ext cx="1112144" cy="319648"/>
+                  </a:xfrm>
+                  <a:prstGeom prst="rect">
+                    <a:avLst/>
+                  </a:prstGeom>
+                  <a:solidFill>
+                    <a:schemeClr val="bg1"/>
+                  </a:solidFill>
+                </p:spPr>
+                <p:txBody>
+                  <a:bodyPr wrap="square" rtlCol="0">
+                    <a:spAutoFit/>
+                  </a:bodyPr>
+                  <a:lstStyle/>
+                  <a:p>
+                    <a:r>
+                      <a:rPr lang="en-CA" dirty="0"/>
+                      <a:t>Greenland</a:t>
+                    </a:r>
+                  </a:p>
+                </p:txBody>
+              </p:sp>
+            </p:grpSp>
+            <p:sp>
+              <p:nvSpPr>
+                <p:cNvPr id="25" name="Google Shape;166;p18">
+                  <a:extLst>
+                    <a:ext uri="{FF2B5EF4-FFF2-40B4-BE49-F238E27FC236}">
+                      <a16:creationId xmlns:a16="http://schemas.microsoft.com/office/drawing/2014/main" id="{AF92A9A9-3649-B83B-9B36-8E0474B9F02E}"/>
+                    </a:ext>
+                  </a:extLst>
+                </p:cNvPr>
+                <p:cNvSpPr txBox="1"/>
+                <p:nvPr/>
+              </p:nvSpPr>
               <p:spPr>
                 <a:xfrm>
-                  <a:off x="341450" y="168325"/>
-                  <a:ext cx="6324024" cy="7252424"/>
+                  <a:off x="152400" y="248038"/>
+                  <a:ext cx="642000" cy="369300"/>
                 </a:xfrm>
                 <a:prstGeom prst="rect">
                   <a:avLst/>
@@ -19588,13 +19912,67 @@
                   <a:noFill/>
                 </a:ln>
               </p:spPr>
-            </p:pic>
+              <p:txBody>
+                <a:bodyPr spcFirstLastPara="1" wrap="square" lIns="91425" tIns="45700" rIns="91425" bIns="45700" anchor="t" anchorCtr="0">
+                  <a:spAutoFit/>
+                </a:bodyPr>
+                <a:lstStyle/>
+                <a:p>
+                  <a:pPr marL="0" marR="0" lvl="0" indent="0" algn="l" rtl="0">
+                    <a:lnSpc>
+                      <a:spcPct val="100000"/>
+                    </a:lnSpc>
+                    <a:spcBef>
+                      <a:spcPts val="0"/>
+                    </a:spcBef>
+                    <a:spcAft>
+                      <a:spcPts val="0"/>
+                    </a:spcAft>
+                    <a:buClr>
+                      <a:srgbClr val="000000"/>
+                    </a:buClr>
+                    <a:buSzPts val="1181"/>
+                    <a:buFont typeface="Arial"/>
+                    <a:buNone/>
+                  </a:pPr>
+                  <a:r>
+                    <a:rPr lang="en-CA" sz="1800" b="1" dirty="0">
+                      <a:solidFill>
+                        <a:schemeClr val="dk1"/>
+                      </a:solidFill>
+                    </a:rPr>
+                    <a:t>A</a:t>
+                  </a:r>
+                  <a:r>
+                    <a:rPr lang="en-CA" sz="1800" b="1" i="0" u="none" strike="noStrike" cap="none" dirty="0">
+                      <a:solidFill>
+                        <a:schemeClr val="dk1"/>
+                      </a:solidFill>
+                      <a:latin typeface="Arial"/>
+                      <a:ea typeface="Arial"/>
+                      <a:cs typeface="Arial"/>
+                      <a:sym typeface="Arial"/>
+                    </a:rPr>
+                    <a:t>.</a:t>
+                  </a:r>
+                  <a:endParaRPr sz="1800" b="1" i="0" u="none" strike="noStrike" cap="none" dirty="0">
+                    <a:solidFill>
+                      <a:srgbClr val="000000"/>
+                    </a:solidFill>
+                    <a:latin typeface="Arial"/>
+                    <a:ea typeface="Arial"/>
+                    <a:cs typeface="Arial"/>
+                    <a:sym typeface="Arial"/>
+                  </a:endParaRPr>
+                </a:p>
+              </p:txBody>
+            </p:sp>
             <p:sp>
               <p:nvSpPr>
-                <p:cNvPr id="3" name="TextBox 2">
+                <p:cNvPr id="26" name="Google Shape;166;p18">
                   <a:extLst>
                     <a:ext uri="{FF2B5EF4-FFF2-40B4-BE49-F238E27FC236}">
-                      <a16:creationId xmlns:a16="http://schemas.microsoft.com/office/drawing/2014/main" id="{79585466-EF82-F3E0-6011-D5E29820E2B7}"/>
+                      <a16:creationId xmlns:a16="http://schemas.microsoft.com/office/drawing/2014/main" id="{BC601287-9A63-F60B-B22A-F88832CE824D}"/>
                     </a:ext>
                   </a:extLst>
                 </p:cNvPr>
@@ -19603,185 +19981,71 @@
               </p:nvSpPr>
               <p:spPr>
                 <a:xfrm>
-                  <a:off x="31640" y="873653"/>
-                  <a:ext cx="770194" cy="307777"/>
+                  <a:off x="679121" y="7800040"/>
+                  <a:ext cx="1462399" cy="369291"/>
                 </a:xfrm>
                 <a:prstGeom prst="rect">
                   <a:avLst/>
                 </a:prstGeom>
-                <a:solidFill>
-                  <a:schemeClr val="bg1"/>
-                </a:solidFill>
+                <a:noFill/>
+                <a:ln>
+                  <a:noFill/>
+                </a:ln>
               </p:spPr>
               <p:txBody>
-                <a:bodyPr wrap="square" rtlCol="0">
+                <a:bodyPr spcFirstLastPara="1" wrap="square" lIns="91425" tIns="45700" rIns="91425" bIns="45700" anchor="t" anchorCtr="0">
                   <a:spAutoFit/>
                 </a:bodyPr>
                 <a:lstStyle/>
                 <a:p>
+                  <a:pPr marL="0" marR="0" lvl="0" indent="0" algn="l" rtl="0">
+                    <a:lnSpc>
+                      <a:spcPct val="100000"/>
+                    </a:lnSpc>
+                    <a:spcBef>
+                      <a:spcPts val="0"/>
+                    </a:spcBef>
+                    <a:spcAft>
+                      <a:spcPts val="0"/>
+                    </a:spcAft>
+                    <a:buClr>
+                      <a:srgbClr val="000000"/>
+                    </a:buClr>
+                    <a:buSzPts val="1181"/>
+                    <a:buFont typeface="Arial"/>
+                    <a:buNone/>
+                  </a:pPr>
                   <a:r>
-                    <a:rPr lang="en-CA" dirty="0"/>
-                    <a:t>Alaska</a:t>
+                    <a:rPr lang="en-CA" sz="1800" b="1" i="0" u="none" strike="noStrike" cap="none" dirty="0">
+                      <a:solidFill>
+                        <a:schemeClr val="dk1"/>
+                      </a:solidFill>
+                      <a:latin typeface="Arial"/>
+                      <a:ea typeface="Arial"/>
+                      <a:cs typeface="Arial"/>
+                      <a:sym typeface="Arial"/>
+                    </a:rPr>
+                    <a:t>B. Alaska</a:t>
                   </a:r>
-                </a:p>
-              </p:txBody>
-            </p:sp>
-            <p:sp>
-              <p:nvSpPr>
-                <p:cNvPr id="4" name="TextBox 3">
-                  <a:extLst>
-                    <a:ext uri="{FF2B5EF4-FFF2-40B4-BE49-F238E27FC236}">
-                      <a16:creationId xmlns:a16="http://schemas.microsoft.com/office/drawing/2014/main" id="{BB270E99-CBCB-CDFC-F86B-F7F0AEF9080B}"/>
-                    </a:ext>
-                  </a:extLst>
-                </p:cNvPr>
-                <p:cNvSpPr txBox="1"/>
-                <p:nvPr/>
-              </p:nvSpPr>
-              <p:spPr>
-                <a:xfrm>
-                  <a:off x="58178" y="2099595"/>
-                  <a:ext cx="770194" cy="307777"/>
-                </a:xfrm>
-                <a:prstGeom prst="rect">
-                  <a:avLst/>
-                </a:prstGeom>
-                <a:solidFill>
-                  <a:schemeClr val="bg1"/>
-                </a:solidFill>
-              </p:spPr>
-              <p:txBody>
-                <a:bodyPr wrap="square" rtlCol="0">
-                  <a:spAutoFit/>
-                </a:bodyPr>
-                <a:lstStyle/>
-                <a:p>
-                  <a:r>
-                    <a:rPr lang="en-CA" dirty="0"/>
-                    <a:t>Europe</a:t>
-                  </a:r>
-                </a:p>
-              </p:txBody>
-            </p:sp>
-            <p:sp>
-              <p:nvSpPr>
-                <p:cNvPr id="5" name="TextBox 4">
-                  <a:extLst>
-                    <a:ext uri="{FF2B5EF4-FFF2-40B4-BE49-F238E27FC236}">
-                      <a16:creationId xmlns:a16="http://schemas.microsoft.com/office/drawing/2014/main" id="{F25BEFB4-22DA-48C4-B23C-DA2057D7D90C}"/>
-                    </a:ext>
-                  </a:extLst>
-                </p:cNvPr>
-                <p:cNvSpPr txBox="1"/>
-                <p:nvPr/>
-              </p:nvSpPr>
-              <p:spPr>
-                <a:xfrm>
-                  <a:off x="-237231" y="3367935"/>
-                  <a:ext cx="1083188" cy="307777"/>
-                </a:xfrm>
-                <a:prstGeom prst="rect">
-                  <a:avLst/>
-                </a:prstGeom>
-                <a:solidFill>
-                  <a:schemeClr val="bg1"/>
-                </a:solidFill>
-              </p:spPr>
-              <p:txBody>
-                <a:bodyPr wrap="square" rtlCol="0">
-                  <a:spAutoFit/>
-                </a:bodyPr>
-                <a:lstStyle/>
-                <a:p>
-                  <a:r>
-                    <a:rPr lang="en-CA" dirty="0"/>
-                    <a:t>Greenland</a:t>
-                  </a:r>
-                </a:p>
-              </p:txBody>
-            </p:sp>
-            <p:sp>
-              <p:nvSpPr>
-                <p:cNvPr id="6" name="TextBox 5">
-                  <a:extLst>
-                    <a:ext uri="{FF2B5EF4-FFF2-40B4-BE49-F238E27FC236}">
-                      <a16:creationId xmlns:a16="http://schemas.microsoft.com/office/drawing/2014/main" id="{071D517C-5437-B26F-ED08-1DCA3A993FEA}"/>
-                    </a:ext>
-                  </a:extLst>
-                </p:cNvPr>
-                <p:cNvSpPr txBox="1"/>
-                <p:nvPr/>
-              </p:nvSpPr>
-              <p:spPr>
-                <a:xfrm>
-                  <a:off x="17584" y="4636275"/>
-                  <a:ext cx="819418" cy="307777"/>
-                </a:xfrm>
-                <a:prstGeom prst="rect">
-                  <a:avLst/>
-                </a:prstGeom>
-                <a:solidFill>
-                  <a:schemeClr val="bg1"/>
-                </a:solidFill>
-              </p:spPr>
-              <p:txBody>
-                <a:bodyPr wrap="square" rtlCol="0">
-                  <a:spAutoFit/>
-                </a:bodyPr>
-                <a:lstStyle/>
-                <a:p>
-                  <a:r>
-                    <a:rPr lang="en-CA" dirty="0"/>
-                    <a:t>Russia</a:t>
-                  </a:r>
-                </a:p>
-              </p:txBody>
-            </p:sp>
-            <p:sp>
-              <p:nvSpPr>
-                <p:cNvPr id="7" name="TextBox 6">
-                  <a:extLst>
-                    <a:ext uri="{FF2B5EF4-FFF2-40B4-BE49-F238E27FC236}">
-                      <a16:creationId xmlns:a16="http://schemas.microsoft.com/office/drawing/2014/main" id="{71419262-E29D-A5E5-1B86-E60414B9F7CF}"/>
-                    </a:ext>
-                  </a:extLst>
-                </p:cNvPr>
-                <p:cNvSpPr txBox="1"/>
-                <p:nvPr/>
-              </p:nvSpPr>
-              <p:spPr>
-                <a:xfrm>
-                  <a:off x="-437720" y="5874623"/>
-                  <a:ext cx="1294203" cy="307777"/>
-                </a:xfrm>
-                <a:prstGeom prst="rect">
-                  <a:avLst/>
-                </a:prstGeom>
-                <a:solidFill>
-                  <a:schemeClr val="bg1"/>
-                </a:solidFill>
-              </p:spPr>
-              <p:txBody>
-                <a:bodyPr wrap="square" rtlCol="0">
-                  <a:spAutoFit/>
-                </a:bodyPr>
-                <a:lstStyle/>
-                <a:p>
-                  <a:r>
-                    <a:rPr lang="en-CA" dirty="0" err="1"/>
-                    <a:t>Saximontana</a:t>
-                  </a:r>
-                  <a:endParaRPr lang="en-CA" dirty="0"/>
+                  <a:endParaRPr sz="1800" b="1" i="0" u="none" strike="noStrike" cap="none" dirty="0">
+                    <a:solidFill>
+                      <a:srgbClr val="000000"/>
+                    </a:solidFill>
+                    <a:latin typeface="Arial"/>
+                    <a:ea typeface="Arial"/>
+                    <a:cs typeface="Arial"/>
+                    <a:sym typeface="Arial"/>
+                  </a:endParaRPr>
                 </a:p>
               </p:txBody>
             </p:sp>
           </p:grpSp>
           <p:sp>
             <p:nvSpPr>
-              <p:cNvPr id="9" name="TextBox 8">
+              <p:cNvPr id="21" name="Google Shape;166;p18">
                 <a:extLst>
                   <a:ext uri="{FF2B5EF4-FFF2-40B4-BE49-F238E27FC236}">
-                    <a16:creationId xmlns:a16="http://schemas.microsoft.com/office/drawing/2014/main" id="{F6E174F9-7AD0-B4E2-2DEF-61BBDA459112}"/>
+                    <a16:creationId xmlns:a16="http://schemas.microsoft.com/office/drawing/2014/main" id="{70DCB384-F5F0-7CC5-7E5C-73AEC39F3775}"/>
                   </a:ext>
                 </a:extLst>
               </p:cNvPr>
@@ -19789,221 +20053,74 @@
               <p:nvPr/>
             </p:nvSpPr>
             <p:spPr>
-              <a:xfrm rot="16200000">
-                <a:off x="4950253" y="7197592"/>
-                <a:ext cx="1245019" cy="319646"/>
+              <a:xfrm>
+                <a:off x="7427174" y="7800040"/>
+                <a:ext cx="1440700" cy="369291"/>
               </a:xfrm>
               <a:prstGeom prst="rect">
                 <a:avLst/>
               </a:prstGeom>
-              <a:solidFill>
-                <a:schemeClr val="bg1"/>
-              </a:solidFill>
+              <a:noFill/>
+              <a:ln>
+                <a:noFill/>
+              </a:ln>
             </p:spPr>
             <p:txBody>
-              <a:bodyPr wrap="square" rtlCol="0">
+              <a:bodyPr spcFirstLastPara="1" wrap="square" lIns="91425" tIns="45700" rIns="91425" bIns="45700" anchor="t" anchorCtr="0">
                 <a:spAutoFit/>
               </a:bodyPr>
               <a:lstStyle/>
               <a:p>
+                <a:pPr marL="0" marR="0" lvl="0" indent="0" algn="l" rtl="0">
+                  <a:lnSpc>
+                    <a:spcPct val="100000"/>
+                  </a:lnSpc>
+                  <a:spcBef>
+                    <a:spcPts val="0"/>
+                  </a:spcBef>
+                  <a:spcAft>
+                    <a:spcPts val="0"/>
+                  </a:spcAft>
+                  <a:buClr>
+                    <a:srgbClr val="000000"/>
+                  </a:buClr>
+                  <a:buSzPts val="1181"/>
+                  <a:buFont typeface="Arial"/>
+                  <a:buNone/>
+                </a:pPr>
                 <a:r>
-                  <a:rPr lang="en-CA" dirty="0" err="1"/>
-                  <a:t>Saximontana</a:t>
+                  <a:rPr lang="en-CA" sz="1800" b="1" dirty="0">
+                    <a:solidFill>
+                      <a:schemeClr val="dk1"/>
+                    </a:solidFill>
+                  </a:rPr>
+                  <a:t>C</a:t>
                 </a:r>
-                <a:endParaRPr lang="en-CA" dirty="0"/>
-              </a:p>
-            </p:txBody>
-          </p:sp>
-          <p:sp>
-            <p:nvSpPr>
-              <p:cNvPr id="10" name="TextBox 9">
-                <a:extLst>
-                  <a:ext uri="{FF2B5EF4-FFF2-40B4-BE49-F238E27FC236}">
-                    <a16:creationId xmlns:a16="http://schemas.microsoft.com/office/drawing/2014/main" id="{94D67BA5-D9DF-DD44-E039-C16C3B536B12}"/>
-                  </a:ext>
-                </a:extLst>
-              </p:cNvPr>
-              <p:cNvSpPr txBox="1"/>
-              <p:nvPr/>
-            </p:nvSpPr>
-            <p:spPr>
-              <a:xfrm rot="16200000">
-                <a:off x="2872920" y="7131153"/>
-                <a:ext cx="1112144" cy="319648"/>
-              </a:xfrm>
-              <a:prstGeom prst="rect">
-                <a:avLst/>
-              </a:prstGeom>
-              <a:solidFill>
-                <a:schemeClr val="bg1"/>
-              </a:solidFill>
-            </p:spPr>
-            <p:txBody>
-              <a:bodyPr wrap="square" rtlCol="0">
-                <a:spAutoFit/>
-              </a:bodyPr>
-              <a:lstStyle/>
-              <a:p>
                 <a:r>
-                  <a:rPr lang="en-CA" dirty="0"/>
-                  <a:t>Greenland</a:t>
+                  <a:rPr lang="en-CA" sz="1800" b="1" i="0" u="none" strike="noStrike" cap="none" dirty="0">
+                    <a:solidFill>
+                      <a:schemeClr val="dk1"/>
+                    </a:solidFill>
+                    <a:latin typeface="Arial"/>
+                    <a:ea typeface="Arial"/>
+                    <a:cs typeface="Arial"/>
+                    <a:sym typeface="Arial"/>
+                  </a:rPr>
+                  <a:t>. Europe</a:t>
                 </a:r>
-              </a:p>
-            </p:txBody>
-          </p:sp>
-        </p:grpSp>
-        <p:sp>
-          <p:nvSpPr>
-            <p:cNvPr id="25" name="Google Shape;166;p18">
-              <a:extLst>
-                <a:ext uri="{FF2B5EF4-FFF2-40B4-BE49-F238E27FC236}">
-                  <a16:creationId xmlns:a16="http://schemas.microsoft.com/office/drawing/2014/main" id="{AF92A9A9-3649-B83B-9B36-8E0474B9F02E}"/>
-                </a:ext>
-              </a:extLst>
-            </p:cNvPr>
-            <p:cNvSpPr txBox="1"/>
-            <p:nvPr/>
-          </p:nvSpPr>
-          <p:spPr>
-            <a:xfrm>
-              <a:off x="152400" y="248038"/>
-              <a:ext cx="642000" cy="369300"/>
-            </a:xfrm>
-            <a:prstGeom prst="rect">
-              <a:avLst/>
-            </a:prstGeom>
-            <a:noFill/>
-            <a:ln>
-              <a:noFill/>
-            </a:ln>
-          </p:spPr>
-          <p:txBody>
-            <a:bodyPr spcFirstLastPara="1" wrap="square" lIns="91425" tIns="45700" rIns="91425" bIns="45700" anchor="t" anchorCtr="0">
-              <a:spAutoFit/>
-            </a:bodyPr>
-            <a:lstStyle/>
-            <a:p>
-              <a:pPr marL="0" marR="0" lvl="0" indent="0" algn="l" rtl="0">
-                <a:lnSpc>
-                  <a:spcPct val="100000"/>
-                </a:lnSpc>
-                <a:spcBef>
-                  <a:spcPts val="0"/>
-                </a:spcBef>
-                <a:spcAft>
-                  <a:spcPts val="0"/>
-                </a:spcAft>
-                <a:buClr>
-                  <a:srgbClr val="000000"/>
-                </a:buClr>
-                <a:buSzPts val="1181"/>
-                <a:buFont typeface="Arial"/>
-                <a:buNone/>
-              </a:pPr>
-              <a:r>
-                <a:rPr lang="en-CA" sz="1800" b="1" dirty="0">
+                <a:endParaRPr sz="1800" b="1" i="0" u="none" strike="noStrike" cap="none" dirty="0">
                   <a:solidFill>
-                    <a:schemeClr val="dk1"/>
-                  </a:solidFill>
-                </a:rPr>
-                <a:t>A</a:t>
-              </a:r>
-              <a:r>
-                <a:rPr lang="en-CA" sz="1800" b="1" i="0" u="none" strike="noStrike" cap="none" dirty="0">
-                  <a:solidFill>
-                    <a:schemeClr val="dk1"/>
+                    <a:srgbClr val="000000"/>
                   </a:solidFill>
                   <a:latin typeface="Arial"/>
                   <a:ea typeface="Arial"/>
                   <a:cs typeface="Arial"/>
                   <a:sym typeface="Arial"/>
-                </a:rPr>
-                <a:t>.</a:t>
-              </a:r>
-              <a:endParaRPr sz="1800" b="1" i="0" u="none" strike="noStrike" cap="none" dirty="0">
-                <a:solidFill>
-                  <a:srgbClr val="000000"/>
-                </a:solidFill>
-                <a:latin typeface="Arial"/>
-                <a:ea typeface="Arial"/>
-                <a:cs typeface="Arial"/>
-                <a:sym typeface="Arial"/>
-              </a:endParaRPr>
-            </a:p>
-          </p:txBody>
-        </p:sp>
-        <p:sp>
-          <p:nvSpPr>
-            <p:cNvPr id="26" name="Google Shape;166;p18">
-              <a:extLst>
-                <a:ext uri="{FF2B5EF4-FFF2-40B4-BE49-F238E27FC236}">
-                  <a16:creationId xmlns:a16="http://schemas.microsoft.com/office/drawing/2014/main" id="{BC601287-9A63-F60B-B22A-F88832CE824D}"/>
-                </a:ext>
-              </a:extLst>
-            </p:cNvPr>
-            <p:cNvSpPr txBox="1"/>
-            <p:nvPr/>
-          </p:nvSpPr>
-          <p:spPr>
-            <a:xfrm>
-              <a:off x="113124" y="7510540"/>
-              <a:ext cx="539262" cy="369291"/>
-            </a:xfrm>
-            <a:prstGeom prst="rect">
-              <a:avLst/>
-            </a:prstGeom>
-            <a:noFill/>
-            <a:ln>
-              <a:noFill/>
-            </a:ln>
-          </p:spPr>
-          <p:txBody>
-            <a:bodyPr spcFirstLastPara="1" wrap="square" lIns="91425" tIns="45700" rIns="91425" bIns="45700" anchor="t" anchorCtr="0">
-              <a:spAutoFit/>
-            </a:bodyPr>
-            <a:lstStyle/>
-            <a:p>
-              <a:pPr marL="0" marR="0" lvl="0" indent="0" algn="l" rtl="0">
-                <a:lnSpc>
-                  <a:spcPct val="100000"/>
-                </a:lnSpc>
-                <a:spcBef>
-                  <a:spcPts val="0"/>
-                </a:spcBef>
-                <a:spcAft>
-                  <a:spcPts val="0"/>
-                </a:spcAft>
-                <a:buClr>
-                  <a:srgbClr val="000000"/>
-                </a:buClr>
-                <a:buSzPts val="1181"/>
-                <a:buFont typeface="Arial"/>
-                <a:buNone/>
-              </a:pPr>
-              <a:r>
-                <a:rPr lang="en-CA" sz="1800" b="1" i="0" u="none" strike="noStrike" cap="none" dirty="0">
-                  <a:solidFill>
-                    <a:schemeClr val="dk1"/>
-                  </a:solidFill>
-                  <a:latin typeface="Arial"/>
-                  <a:ea typeface="Arial"/>
-                  <a:cs typeface="Arial"/>
-                  <a:sym typeface="Arial"/>
-                </a:rPr>
-                <a:t>B.</a:t>
-              </a:r>
-              <a:endParaRPr sz="1800" b="1" i="0" u="none" strike="noStrike" cap="none" dirty="0">
-                <a:solidFill>
-                  <a:srgbClr val="000000"/>
-                </a:solidFill>
-                <a:latin typeface="Arial"/>
-                <a:ea typeface="Arial"/>
-                <a:cs typeface="Arial"/>
-                <a:sym typeface="Arial"/>
-              </a:endParaRPr>
-            </a:p>
-          </p:txBody>
-        </p:sp>
+                </a:endParaRPr>
+              </a:p>
+            </p:txBody>
+          </p:sp>
+        </p:grpSp>
       </p:grpSp>
     </p:spTree>
   </p:cSld>

</xml_diff>